<commit_message>
Updates to allow error handling for failed mcnp runs without killing program.
</commit_message>
<xml_diff>
--- a/Proposed Workflow.pptx
+++ b/Proposed Workflow.pptx
@@ -104,6 +104,11 @@
       </a:defRPr>
     </a:lvl9pPr>
   </p:defaultTextStyle>
+  <p:extLst>
+    <p:ext uri="{EFAFB233-063F-42B5-8137-9DF3F51BA10A}">
+      <p15:sldGuideLst xmlns:p15="http://schemas.microsoft.com/office/powerpoint/2012/main"/>
+    </p:ext>
+  </p:extLst>
 </p:presentation>
 </file>
 
@@ -238,7 +243,7 @@
           <a:p>
             <a:fld id="{4274545D-6E09-4FBC-ADA4-F064EBDC54A2}" type="datetimeFigureOut">
               <a:rPr lang="en-US" smtClean="0"/>
-              <a:t>10/4/2016</a:t>
+              <a:t>2/1/2017</a:t>
             </a:fld>
             <a:endParaRPr lang="en-US"/>
           </a:p>
@@ -408,7 +413,7 @@
           <a:p>
             <a:fld id="{4274545D-6E09-4FBC-ADA4-F064EBDC54A2}" type="datetimeFigureOut">
               <a:rPr lang="en-US" smtClean="0"/>
-              <a:t>10/4/2016</a:t>
+              <a:t>2/1/2017</a:t>
             </a:fld>
             <a:endParaRPr lang="en-US"/>
           </a:p>
@@ -588,7 +593,7 @@
           <a:p>
             <a:fld id="{4274545D-6E09-4FBC-ADA4-F064EBDC54A2}" type="datetimeFigureOut">
               <a:rPr lang="en-US" smtClean="0"/>
-              <a:t>10/4/2016</a:t>
+              <a:t>2/1/2017</a:t>
             </a:fld>
             <a:endParaRPr lang="en-US"/>
           </a:p>
@@ -758,7 +763,7 @@
           <a:p>
             <a:fld id="{4274545D-6E09-4FBC-ADA4-F064EBDC54A2}" type="datetimeFigureOut">
               <a:rPr lang="en-US" smtClean="0"/>
-              <a:t>10/4/2016</a:t>
+              <a:t>2/1/2017</a:t>
             </a:fld>
             <a:endParaRPr lang="en-US"/>
           </a:p>
@@ -1004,7 +1009,7 @@
           <a:p>
             <a:fld id="{4274545D-6E09-4FBC-ADA4-F064EBDC54A2}" type="datetimeFigureOut">
               <a:rPr lang="en-US" smtClean="0"/>
-              <a:t>10/4/2016</a:t>
+              <a:t>2/1/2017</a:t>
             </a:fld>
             <a:endParaRPr lang="en-US"/>
           </a:p>
@@ -1236,7 +1241,7 @@
           <a:p>
             <a:fld id="{4274545D-6E09-4FBC-ADA4-F064EBDC54A2}" type="datetimeFigureOut">
               <a:rPr lang="en-US" smtClean="0"/>
-              <a:t>10/4/2016</a:t>
+              <a:t>2/1/2017</a:t>
             </a:fld>
             <a:endParaRPr lang="en-US"/>
           </a:p>
@@ -1603,7 +1608,7 @@
           <a:p>
             <a:fld id="{4274545D-6E09-4FBC-ADA4-F064EBDC54A2}" type="datetimeFigureOut">
               <a:rPr lang="en-US" smtClean="0"/>
-              <a:t>10/4/2016</a:t>
+              <a:t>2/1/2017</a:t>
             </a:fld>
             <a:endParaRPr lang="en-US"/>
           </a:p>
@@ -1721,7 +1726,7 @@
           <a:p>
             <a:fld id="{4274545D-6E09-4FBC-ADA4-F064EBDC54A2}" type="datetimeFigureOut">
               <a:rPr lang="en-US" smtClean="0"/>
-              <a:t>10/4/2016</a:t>
+              <a:t>2/1/2017</a:t>
             </a:fld>
             <a:endParaRPr lang="en-US"/>
           </a:p>
@@ -1816,7 +1821,7 @@
           <a:p>
             <a:fld id="{4274545D-6E09-4FBC-ADA4-F064EBDC54A2}" type="datetimeFigureOut">
               <a:rPr lang="en-US" smtClean="0"/>
-              <a:t>10/4/2016</a:t>
+              <a:t>2/1/2017</a:t>
             </a:fld>
             <a:endParaRPr lang="en-US"/>
           </a:p>
@@ -2093,7 +2098,7 @@
           <a:p>
             <a:fld id="{4274545D-6E09-4FBC-ADA4-F064EBDC54A2}" type="datetimeFigureOut">
               <a:rPr lang="en-US" smtClean="0"/>
-              <a:t>10/4/2016</a:t>
+              <a:t>2/1/2017</a:t>
             </a:fld>
             <a:endParaRPr lang="en-US"/>
           </a:p>
@@ -2346,7 +2351,7 @@
           <a:p>
             <a:fld id="{4274545D-6E09-4FBC-ADA4-F064EBDC54A2}" type="datetimeFigureOut">
               <a:rPr lang="en-US" smtClean="0"/>
-              <a:t>10/4/2016</a:t>
+              <a:t>2/1/2017</a:t>
             </a:fld>
             <a:endParaRPr lang="en-US"/>
           </a:p>
@@ -2559,7 +2564,7 @@
           <a:p>
             <a:fld id="{4274545D-6E09-4FBC-ADA4-F064EBDC54A2}" type="datetimeFigureOut">
               <a:rPr lang="en-US" smtClean="0"/>
-              <a:t>10/4/2016</a:t>
+              <a:t>2/1/2017</a:t>
             </a:fld>
             <a:endParaRPr lang="en-US"/>
           </a:p>
@@ -2996,25 +3001,17 @@
           </a:p>
           <a:p>
             <a:r>
+              <a:rPr lang="en-US" strike="sngStrike" dirty="0" smtClean="0"/>
+              <a:t>Objective Spectrum (csv)</a:t>
+            </a:r>
+          </a:p>
+          <a:p>
+            <a:r>
+              <a:rPr lang="en-US" dirty="0" err="1" smtClean="0"/>
+              <a:t>Gnowee</a:t>
+            </a:r>
+            <a:r>
               <a:rPr lang="en-US" dirty="0" smtClean="0"/>
-              <a:t>Objective Spectrum (csv)</a:t>
-            </a:r>
-          </a:p>
-          <a:p>
-            <a:r>
-              <a:rPr lang="en-US" dirty="0" err="1" smtClean="0">
-                <a:solidFill>
-                  <a:srgbClr val="FFC000"/>
-                </a:solidFill>
-              </a:rPr>
-              <a:t>Gnowee</a:t>
-            </a:r>
-            <a:r>
-              <a:rPr lang="en-US" dirty="0" smtClean="0">
-                <a:solidFill>
-                  <a:srgbClr val="FFC000"/>
-                </a:solidFill>
-              </a:rPr>
               <a:t> Settings (csv)</a:t>
             </a:r>
           </a:p>
@@ -3128,122 +3125,6 @@
           </a:fontRef>
         </p:style>
       </p:cxnSp>
-      <p:sp>
-        <p:nvSpPr>
-          <p:cNvPr id="8" name="TextBox 7"/>
-          <p:cNvSpPr txBox="1"/>
-          <p:nvPr/>
-        </p:nvSpPr>
-        <p:spPr>
-          <a:xfrm>
-            <a:off x="166334" y="3769883"/>
-            <a:ext cx="3737072" cy="3416320"/>
-          </a:xfrm>
-          <a:prstGeom prst="rect">
-            <a:avLst/>
-          </a:prstGeom>
-          <a:noFill/>
-        </p:spPr>
-        <p:txBody>
-          <a:bodyPr wrap="square" rtlCol="0">
-            <a:spAutoFit/>
-          </a:bodyPr>
-          <a:lstStyle/>
-          <a:p>
-            <a:r>
-              <a:rPr lang="en-US" dirty="0" smtClean="0"/>
-              <a:t>Tasks: </a:t>
-            </a:r>
-          </a:p>
-          <a:p>
-            <a:r>
-              <a:rPr lang="en-US" dirty="0" smtClean="0"/>
-              <a:t>-    Remove default initialization</a:t>
-            </a:r>
-          </a:p>
-          <a:p>
-            <a:pPr marL="285750" indent="-285750">
-              <a:buFontTx/>
-              <a:buChar char="-"/>
-            </a:pPr>
-            <a:r>
-              <a:rPr lang="en-US" dirty="0" smtClean="0"/>
-              <a:t>Make </a:t>
-            </a:r>
-            <a:r>
-              <a:rPr lang="en-US" dirty="0" err="1" smtClean="0"/>
-              <a:t>Coeus</a:t>
-            </a:r>
-            <a:r>
-              <a:rPr lang="en-US" dirty="0" smtClean="0"/>
-              <a:t> Main modular</a:t>
-            </a:r>
-          </a:p>
-          <a:p>
-            <a:pPr marL="285750" indent="-285750">
-              <a:buFontTx/>
-              <a:buChar char="-"/>
-            </a:pPr>
-            <a:r>
-              <a:rPr lang="en-US" dirty="0" smtClean="0"/>
-              <a:t>Add user specification of constraints in </a:t>
-            </a:r>
-            <a:r>
-              <a:rPr lang="en-US" dirty="0" err="1" smtClean="0"/>
-              <a:t>Gnowee</a:t>
-            </a:r>
-            <a:r>
-              <a:rPr lang="en-US" dirty="0" smtClean="0"/>
-              <a:t> Settings input</a:t>
-            </a:r>
-          </a:p>
-          <a:p>
-            <a:pPr marL="285750" indent="-285750">
-              <a:buFontTx/>
-              <a:buChar char="-"/>
-            </a:pPr>
-            <a:r>
-              <a:rPr lang="en-US" dirty="0" smtClean="0"/>
-              <a:t>Add user specification of objective function in </a:t>
-            </a:r>
-            <a:r>
-              <a:rPr lang="en-US" dirty="0" err="1" smtClean="0"/>
-              <a:t>Gnowee</a:t>
-            </a:r>
-            <a:r>
-              <a:rPr lang="en-US" dirty="0" smtClean="0"/>
-              <a:t> Settings input</a:t>
-            </a:r>
-          </a:p>
-          <a:p>
-            <a:pPr marL="285750" indent="-285750">
-              <a:buFontTx/>
-              <a:buChar char="-"/>
-            </a:pPr>
-            <a:r>
-              <a:rPr lang="en-US" dirty="0" smtClean="0"/>
-              <a:t>User guide for inputs and options</a:t>
-            </a:r>
-          </a:p>
-          <a:p>
-            <a:pPr marL="285750" indent="-285750">
-              <a:buFontTx/>
-              <a:buChar char="-"/>
-            </a:pPr>
-            <a:r>
-              <a:rPr lang="en-US" dirty="0" smtClean="0"/>
-              <a:t>Modify MCNP reader for use with worm and variable specification</a:t>
-            </a:r>
-          </a:p>
-          <a:p>
-            <a:pPr marL="285750" indent="-285750">
-              <a:buFontTx/>
-              <a:buChar char="-"/>
-            </a:pPr>
-            <a:endParaRPr lang="en-US" dirty="0"/>
-          </a:p>
-        </p:txBody>
-      </p:sp>
       <p:sp>
         <p:nvSpPr>
           <p:cNvPr id="9" name="TextBox 8"/>
@@ -3378,8 +3259,8 @@
         </p:nvCxnSpPr>
         <p:spPr>
           <a:xfrm flipV="1">
-            <a:off x="3559277" y="1524000"/>
-            <a:ext cx="678427" cy="835742"/>
+            <a:off x="2497394" y="1524000"/>
+            <a:ext cx="1740310" cy="285135"/>
           </a:xfrm>
           <a:prstGeom prst="straightConnector1">
             <a:avLst/>
@@ -3411,8 +3292,8 @@
         </p:nvCxnSpPr>
         <p:spPr>
           <a:xfrm flipV="1">
-            <a:off x="3578942" y="1738144"/>
-            <a:ext cx="658762" cy="675091"/>
+            <a:off x="2497394" y="1738145"/>
+            <a:ext cx="1740310" cy="290680"/>
           </a:xfrm>
           <a:prstGeom prst="straightConnector1">
             <a:avLst/>
@@ -3534,14 +3415,14 @@
           <p:cNvPr id="26" name="Straight Arrow Connector 25"/>
           <p:cNvCxnSpPr>
             <a:stCxn id="24" idx="2"/>
-            <a:endCxn id="29" idx="0"/>
+            <a:endCxn id="34" idx="0"/>
           </p:cNvCxnSpPr>
           <p:nvPr/>
         </p:nvCxnSpPr>
         <p:spPr>
           <a:xfrm>
             <a:off x="8696633" y="1181982"/>
-            <a:ext cx="0" cy="627153"/>
+            <a:ext cx="0" cy="1900637"/>
           </a:xfrm>
           <a:prstGeom prst="straightConnector1">
             <a:avLst/>
@@ -3573,8 +3454,8 @@
         </p:nvSpPr>
         <p:spPr>
           <a:xfrm>
-            <a:off x="7796981" y="1809135"/>
-            <a:ext cx="1799304" cy="646331"/>
+            <a:off x="6685935" y="1761798"/>
+            <a:ext cx="1799304" cy="923330"/>
           </a:xfrm>
           <a:prstGeom prst="rect">
             <a:avLst/>
@@ -3589,7 +3470,11 @@
           <a:p>
             <a:r>
               <a:rPr lang="en-US" dirty="0" smtClean="0"/>
-              <a:t>Generate C/D variable vector </a:t>
+              <a:t>Generate </a:t>
+            </a:r>
+            <a:r>
+              <a:rPr lang="en-US" dirty="0" smtClean="0"/>
+              <a:t>variable, type, &amp; bounds vectors</a:t>
             </a:r>
             <a:endParaRPr lang="en-US" dirty="0"/>
           </a:p>
@@ -3606,7 +3491,7 @@
         <p:spPr>
           <a:xfrm>
             <a:off x="5771535" y="1495558"/>
-            <a:ext cx="2025446" cy="636743"/>
+            <a:ext cx="914400" cy="727905"/>
           </a:xfrm>
           <a:prstGeom prst="straightConnector1">
             <a:avLst/>
@@ -3634,14 +3519,15 @@
         <p:nvCxnSpPr>
           <p:cNvPr id="33" name="Straight Arrow Connector 32"/>
           <p:cNvCxnSpPr>
+            <a:stCxn id="29" idx="2"/>
             <a:endCxn id="34" idx="0"/>
           </p:cNvCxnSpPr>
           <p:nvPr/>
         </p:nvCxnSpPr>
         <p:spPr>
           <a:xfrm>
-            <a:off x="8696633" y="2455466"/>
-            <a:ext cx="0" cy="627153"/>
+            <a:off x="7585587" y="2685128"/>
+            <a:ext cx="1111046" cy="397491"/>
           </a:xfrm>
           <a:prstGeom prst="straightConnector1">
             <a:avLst/>
@@ -3699,14 +3585,14 @@
         <p:nvCxnSpPr>
           <p:cNvPr id="36" name="Straight Arrow Connector 35"/>
           <p:cNvCxnSpPr>
-            <a:endCxn id="34" idx="1"/>
+            <a:endCxn id="24" idx="1"/>
           </p:cNvCxnSpPr>
           <p:nvPr/>
         </p:nvCxnSpPr>
         <p:spPr>
-          <a:xfrm>
-            <a:off x="5958348" y="952691"/>
-            <a:ext cx="1838633" cy="2314594"/>
+          <a:xfrm flipV="1">
+            <a:off x="5958348" y="858817"/>
+            <a:ext cx="1838633" cy="93874"/>
           </a:xfrm>
           <a:prstGeom prst="straightConnector1">
             <a:avLst/>
@@ -4062,14 +3948,14 @@
         <p:nvCxnSpPr>
           <p:cNvPr id="53" name="Straight Arrow Connector 52"/>
           <p:cNvCxnSpPr>
-            <a:endCxn id="51" idx="1"/>
+            <a:endCxn id="24" idx="1"/>
           </p:cNvCxnSpPr>
           <p:nvPr/>
         </p:nvCxnSpPr>
         <p:spPr>
-          <a:xfrm>
-            <a:off x="5958348" y="1239699"/>
-            <a:ext cx="1838633" cy="4066722"/>
+          <a:xfrm flipV="1">
+            <a:off x="5958348" y="858817"/>
+            <a:ext cx="1838633" cy="380882"/>
           </a:xfrm>
           <a:prstGeom prst="straightConnector1">
             <a:avLst/>
@@ -4096,13 +3982,15 @@
       <p:cxnSp>
         <p:nvCxnSpPr>
           <p:cNvPr id="55" name="Straight Arrow Connector 54"/>
-          <p:cNvCxnSpPr/>
+          <p:cNvCxnSpPr>
+            <a:endCxn id="24" idx="1"/>
+          </p:cNvCxnSpPr>
           <p:nvPr/>
         </p:nvCxnSpPr>
         <p:spPr>
-          <a:xfrm>
-            <a:off x="5771535" y="1738144"/>
-            <a:ext cx="2113936" cy="2328464"/>
+          <a:xfrm flipV="1">
+            <a:off x="5771535" y="858817"/>
+            <a:ext cx="2025446" cy="879327"/>
           </a:xfrm>
           <a:prstGeom prst="straightConnector1">
             <a:avLst/>
@@ -4324,13 +4212,48 @@
       <p:cxnSp>
         <p:nvCxnSpPr>
           <p:cNvPr id="68" name="Straight Arrow Connector 67"/>
+          <p:cNvCxnSpPr>
+            <a:endCxn id="34" idx="3"/>
+          </p:cNvCxnSpPr>
+          <p:nvPr/>
+        </p:nvCxnSpPr>
+        <p:spPr>
+          <a:xfrm flipH="1" flipV="1">
+            <a:off x="9596285" y="3267285"/>
+            <a:ext cx="1002890" cy="1854470"/>
+          </a:xfrm>
+          <a:prstGeom prst="straightConnector1">
+            <a:avLst/>
+          </a:prstGeom>
+          <a:ln>
+            <a:tailEnd type="triangle"/>
+          </a:ln>
+        </p:spPr>
+        <p:style>
+          <a:lnRef idx="1">
+            <a:schemeClr val="accent1"/>
+          </a:lnRef>
+          <a:fillRef idx="0">
+            <a:schemeClr val="accent1"/>
+          </a:fillRef>
+          <a:effectRef idx="0">
+            <a:schemeClr val="accent1"/>
+          </a:effectRef>
+          <a:fontRef idx="minor">
+            <a:schemeClr val="tx1"/>
+          </a:fontRef>
+        </p:style>
+      </p:cxnSp>
+      <p:cxnSp>
+        <p:nvCxnSpPr>
+          <p:cNvPr id="42" name="Straight Arrow Connector 41"/>
           <p:cNvCxnSpPr/>
           <p:nvPr/>
         </p:nvCxnSpPr>
         <p:spPr>
-          <a:xfrm flipH="1" flipV="1">
-            <a:off x="9330813" y="2413235"/>
-            <a:ext cx="1268361" cy="2708520"/>
+          <a:xfrm flipV="1">
+            <a:off x="3583858" y="1513670"/>
+            <a:ext cx="624348" cy="755898"/>
           </a:xfrm>
           <a:prstGeom prst="straightConnector1">
             <a:avLst/>

</xml_diff>